<commit_message>
Update with empty backgrounds
</commit_message>
<xml_diff>
--- a/Presentation/F23-Template-MS_Office.pptx
+++ b/Presentation/F23-Template-MS_Office.pptx
@@ -10,6 +10,7 @@
   <p:sldIdLst>
     <p:sldId id="256" r:id="rId6"/>
     <p:sldId id="257" r:id="rId7"/>
+    <p:sldId id="258" r:id="rId8"/>
   </p:sldIdLst>
   <p:sldSz cx="10080625" cy="5670550"/>
   <p:notesSz cx="7559675" cy="10691813"/>
@@ -67,7 +68,7 @@
         <p:txBody>
           <a:bodyPr/>
           <a:p>
-            <a:fld id="{8D252A49-92AE-433A-92E1-8DC15488A2EE}" type="slidenum">
+            <a:fld id="{D7C0DD43-FB53-426B-849D-0A5559C97820}" type="slidenum">
               <a:t>&lt;#&gt;</a:t>
             </a:fld>
           </a:p>
@@ -276,7 +277,7 @@
         <p:txBody>
           <a:bodyPr/>
           <a:p>
-            <a:fld id="{85ED436E-5055-49BE-A103-6BE5E07F635A}" type="slidenum">
+            <a:fld id="{D2B1B5CC-2970-4EA5-B233-CB30A3B23BFF}" type="slidenum">
               <a:t>&lt;#&gt;</a:t>
             </a:fld>
           </a:p>
@@ -571,7 +572,7 @@
         <p:txBody>
           <a:bodyPr/>
           <a:p>
-            <a:fld id="{6C38F6B1-970C-43AE-BE6F-D9F75E9880E0}" type="slidenum">
+            <a:fld id="{851CD29C-8E58-4EE4-A633-1C71303EAB39}" type="slidenum">
               <a:t>&lt;#&gt;</a:t>
             </a:fld>
           </a:p>
@@ -952,7 +953,7 @@
         <p:txBody>
           <a:bodyPr/>
           <a:p>
-            <a:fld id="{C85DF0B6-636D-4303-BD2D-09044C8C94E8}" type="slidenum">
+            <a:fld id="{EE79F42D-F9A6-4CCB-87DC-CBF132FB0466}" type="slidenum">
               <a:t>&lt;#&gt;</a:t>
             </a:fld>
           </a:p>
@@ -1035,7 +1036,7 @@
         <p:txBody>
           <a:bodyPr/>
           <a:p>
-            <a:fld id="{9530AF11-0568-422B-917F-904FF96F29E5}" type="slidenum">
+            <a:fld id="{5648911A-BACB-429D-B1EC-DC7CC1802622}" type="slidenum">
               <a:t>&lt;#&gt;</a:t>
             </a:fld>
           </a:p>
@@ -1198,7 +1199,7 @@
         <p:txBody>
           <a:bodyPr/>
           <a:p>
-            <a:fld id="{3BF26DA8-02C9-47E9-A992-E9A0897DC772}" type="slidenum">
+            <a:fld id="{64CA8D8A-C432-4101-9CA1-FC7DB809B227}" type="slidenum">
               <a:t>&lt;#&gt;</a:t>
             </a:fld>
           </a:p>
@@ -1364,7 +1365,7 @@
         <p:txBody>
           <a:bodyPr/>
           <a:p>
-            <a:fld id="{3D614233-1E07-4962-B063-8FF0AFEF4C82}" type="slidenum">
+            <a:fld id="{DC03D48E-6214-4A26-B761-7D14562FD21E}" type="slidenum">
               <a:t>&lt;#&gt;</a:t>
             </a:fld>
           </a:p>
@@ -1573,7 +1574,7 @@
         <p:txBody>
           <a:bodyPr/>
           <a:p>
-            <a:fld id="{1B08709B-C9F7-4137-97BE-31831F98DCAF}" type="slidenum">
+            <a:fld id="{6B361D90-D2E0-4507-AE42-4FB5DE4CB58A}" type="slidenum">
               <a:t>&lt;#&gt;</a:t>
             </a:fld>
           </a:p>
@@ -1696,7 +1697,7 @@
         <p:txBody>
           <a:bodyPr/>
           <a:p>
-            <a:fld id="{B86AF143-D3B6-4BEC-8B2F-B0CD5A4226F9}" type="slidenum">
+            <a:fld id="{59EC4DF1-B306-4045-AAB0-13E132153D03}" type="slidenum">
               <a:t>&lt;#&gt;</a:t>
             </a:fld>
           </a:p>
@@ -1817,7 +1818,7 @@
         <p:txBody>
           <a:bodyPr/>
           <a:p>
-            <a:fld id="{D4E77EE4-1DB6-4ABB-BC36-A8CB7D1D9165}" type="slidenum">
+            <a:fld id="{8EDC65F9-3693-48D0-971D-DC19E2BDBA0D}" type="slidenum">
               <a:t>&lt;#&gt;</a:t>
             </a:fld>
           </a:p>
@@ -2069,7 +2070,7 @@
         <p:txBody>
           <a:bodyPr/>
           <a:p>
-            <a:fld id="{4DA7A428-B748-4208-9B2B-817CE5A76268}" type="slidenum">
+            <a:fld id="{AE6ECB38-E6D2-41EA-A467-B42D126C14DB}" type="slidenum">
               <a:t>&lt;#&gt;</a:t>
             </a:fld>
           </a:p>
@@ -2232,7 +2233,7 @@
         <p:txBody>
           <a:bodyPr/>
           <a:p>
-            <a:fld id="{C8191EDC-634A-4ABB-8212-F65EB4E25FA9}" type="slidenum">
+            <a:fld id="{BD02D115-1779-462F-8669-F8E20B2B335B}" type="slidenum">
               <a:t>&lt;#&gt;</a:t>
             </a:fld>
           </a:p>
@@ -2484,7 +2485,7 @@
         <p:txBody>
           <a:bodyPr/>
           <a:p>
-            <a:fld id="{3235E546-7B0E-432F-8AE5-4CA625A812F0}" type="slidenum">
+            <a:fld id="{D5FAC590-115C-4453-9D17-24B333D2E2C5}" type="slidenum">
               <a:t>&lt;#&gt;</a:t>
             </a:fld>
           </a:p>
@@ -2736,7 +2737,7 @@
         <p:txBody>
           <a:bodyPr/>
           <a:p>
-            <a:fld id="{3350453D-586B-4D45-A417-CA8A153EBA2F}" type="slidenum">
+            <a:fld id="{4DB5EA7A-1938-4221-8268-66F74F8C146B}" type="slidenum">
               <a:t>&lt;#&gt;</a:t>
             </a:fld>
           </a:p>
@@ -2945,7 +2946,7 @@
         <p:txBody>
           <a:bodyPr/>
           <a:p>
-            <a:fld id="{E7A26B88-2CC9-4A44-A8E1-0906685E76A6}" type="slidenum">
+            <a:fld id="{08BB304F-F605-428F-893F-5024866326D3}" type="slidenum">
               <a:t>&lt;#&gt;</a:t>
             </a:fld>
           </a:p>
@@ -3240,7 +3241,7 @@
         <p:txBody>
           <a:bodyPr/>
           <a:p>
-            <a:fld id="{32B1F8B3-ACE5-4E5A-ACE9-F7DB8495F7CE}" type="slidenum">
+            <a:fld id="{9DB65A04-36D6-4CA8-B64F-25D8507EFA84}" type="slidenum">
               <a:t>&lt;#&gt;</a:t>
             </a:fld>
           </a:p>
@@ -3621,7 +3622,7 @@
         <p:txBody>
           <a:bodyPr/>
           <a:p>
-            <a:fld id="{142CC93C-4F9D-494C-8332-C72F749C0EF1}" type="slidenum">
+            <a:fld id="{7EC36D46-7A6D-4E4B-A177-187E1B61121B}" type="slidenum">
               <a:t>&lt;#&gt;</a:t>
             </a:fld>
           </a:p>
@@ -3704,7 +3705,7 @@
         <p:txBody>
           <a:bodyPr/>
           <a:p>
-            <a:fld id="{6173F0B0-9E5B-4C4B-9822-E0A36BAD0FD7}" type="slidenum">
+            <a:fld id="{0B0AF99F-9861-4519-8291-2441712CF618}" type="slidenum">
               <a:t>&lt;#&gt;</a:t>
             </a:fld>
           </a:p>
@@ -3867,7 +3868,7 @@
         <p:txBody>
           <a:bodyPr/>
           <a:p>
-            <a:fld id="{F7C75101-E139-48C4-BBBD-E1A6F4F2B3D9}" type="slidenum">
+            <a:fld id="{3C774C54-F607-4F71-BE7A-6520AA4D9D1B}" type="slidenum">
               <a:t>&lt;#&gt;</a:t>
             </a:fld>
           </a:p>
@@ -4033,7 +4034,7 @@
         <p:txBody>
           <a:bodyPr/>
           <a:p>
-            <a:fld id="{5DCA08E9-38E4-4ADC-AA69-DB2CB6854303}" type="slidenum">
+            <a:fld id="{D953DA0A-B0A5-47C9-A03F-A21683B63527}" type="slidenum">
               <a:t>&lt;#&gt;</a:t>
             </a:fld>
           </a:p>
@@ -4242,7 +4243,7 @@
         <p:txBody>
           <a:bodyPr/>
           <a:p>
-            <a:fld id="{47C2B7E4-B012-4CD1-B07B-2DA889BDB7EB}" type="slidenum">
+            <a:fld id="{A81E0C36-6847-448B-A339-1C47DD238A50}" type="slidenum">
               <a:t>&lt;#&gt;</a:t>
             </a:fld>
           </a:p>
@@ -4365,7 +4366,7 @@
         <p:txBody>
           <a:bodyPr/>
           <a:p>
-            <a:fld id="{F24554FE-FAF9-43CC-B087-EE1930EDD734}" type="slidenum">
+            <a:fld id="{3628B696-8F66-45D8-8EFE-CE7EF6DC94EB}" type="slidenum">
               <a:t>&lt;#&gt;</a:t>
             </a:fld>
           </a:p>
@@ -4531,7 +4532,7 @@
         <p:txBody>
           <a:bodyPr/>
           <a:p>
-            <a:fld id="{EE83BCFA-BFC8-48BA-879F-0BDBE2930105}" type="slidenum">
+            <a:fld id="{1A4565B3-5143-4927-AB8B-E9928786B1A4}" type="slidenum">
               <a:t>&lt;#&gt;</a:t>
             </a:fld>
           </a:p>
@@ -4652,7 +4653,7 @@
         <p:txBody>
           <a:bodyPr/>
           <a:p>
-            <a:fld id="{E7770B93-264C-44EF-A60F-D48B0186CC73}" type="slidenum">
+            <a:fld id="{8F833632-EF1F-4B83-AE85-2A8E9AD0AAC3}" type="slidenum">
               <a:t>&lt;#&gt;</a:t>
             </a:fld>
           </a:p>
@@ -4904,7 +4905,7 @@
         <p:txBody>
           <a:bodyPr/>
           <a:p>
-            <a:fld id="{26CD07C7-FB86-4719-9CC0-D15498BA9B7B}" type="slidenum">
+            <a:fld id="{37E3CBAB-D1B1-478E-ADDE-39FB82577F13}" type="slidenum">
               <a:t>&lt;#&gt;</a:t>
             </a:fld>
           </a:p>
@@ -5156,7 +5157,7 @@
         <p:txBody>
           <a:bodyPr/>
           <a:p>
-            <a:fld id="{05B5CACF-AFD8-4B32-8291-1BB7989CC73B}" type="slidenum">
+            <a:fld id="{53665B3B-0A78-4CA5-BBDB-42EE4035F7E8}" type="slidenum">
               <a:t>&lt;#&gt;</a:t>
             </a:fld>
           </a:p>
@@ -5408,7 +5409,7 @@
         <p:txBody>
           <a:bodyPr/>
           <a:p>
-            <a:fld id="{E9B16000-E688-4E14-8B46-211AC3D7E4FB}" type="slidenum">
+            <a:fld id="{8D97F481-4DBC-4E63-8B98-6A8DA4419562}" type="slidenum">
               <a:t>&lt;#&gt;</a:t>
             </a:fld>
           </a:p>
@@ -5617,7 +5618,7 @@
         <p:txBody>
           <a:bodyPr/>
           <a:p>
-            <a:fld id="{4B04C5D1-3DBA-4804-987F-A8900D410939}" type="slidenum">
+            <a:fld id="{B904B96F-9A60-4E44-8C7D-1B282CFCC95C}" type="slidenum">
               <a:t>&lt;#&gt;</a:t>
             </a:fld>
           </a:p>
@@ -5912,7 +5913,7 @@
         <p:txBody>
           <a:bodyPr/>
           <a:p>
-            <a:fld id="{9F29B2C1-B75F-4F68-9C84-A88842D57A85}" type="slidenum">
+            <a:fld id="{F1910324-2B4E-4E2A-8EE9-4B79E9C6D867}" type="slidenum">
               <a:t>&lt;#&gt;</a:t>
             </a:fld>
           </a:p>
@@ -6293,7 +6294,7 @@
         <p:txBody>
           <a:bodyPr/>
           <a:p>
-            <a:fld id="{4345E7DF-1A85-400D-814E-C4234FC4BC16}" type="slidenum">
+            <a:fld id="{4B2E9EAC-51A4-4DF2-BFC3-5076EE0320D7}" type="slidenum">
               <a:t>&lt;#&gt;</a:t>
             </a:fld>
           </a:p>
@@ -6376,7 +6377,7 @@
         <p:txBody>
           <a:bodyPr/>
           <a:p>
-            <a:fld id="{9B6F9797-511E-44B4-9FAD-56894B85B39E}" type="slidenum">
+            <a:fld id="{8FE9E45B-8FC9-409C-B367-5FC3B6C3C798}" type="slidenum">
               <a:t>&lt;#&gt;</a:t>
             </a:fld>
           </a:p>
@@ -6539,7 +6540,7 @@
         <p:txBody>
           <a:bodyPr/>
           <a:p>
-            <a:fld id="{F0D14EFA-818B-4A5C-B851-2E87C0103812}" type="slidenum">
+            <a:fld id="{8C2E4A7D-9E80-4FD1-8641-B58911040699}" type="slidenum">
               <a:t>&lt;#&gt;</a:t>
             </a:fld>
           </a:p>
@@ -6705,7 +6706,7 @@
         <p:txBody>
           <a:bodyPr/>
           <a:p>
-            <a:fld id="{42C3A073-F1CC-464C-80FF-C0079F02D3C1}" type="slidenum">
+            <a:fld id="{65F3DCAE-1E06-42D6-A23A-5EFC0C597A30}" type="slidenum">
               <a:t>&lt;#&gt;</a:t>
             </a:fld>
           </a:p>
@@ -6914,7 +6915,7 @@
         <p:txBody>
           <a:bodyPr/>
           <a:p>
-            <a:fld id="{2651439C-8421-4E02-8FA3-FB8FBBE9C0FC}" type="slidenum">
+            <a:fld id="{44770B98-104A-408D-8874-14F2F8ED32E9}" type="slidenum">
               <a:t>&lt;#&gt;</a:t>
             </a:fld>
           </a:p>
@@ -7123,7 +7124,7 @@
         <p:txBody>
           <a:bodyPr/>
           <a:p>
-            <a:fld id="{AAA38545-32F3-4E85-8719-57831EB735D1}" type="slidenum">
+            <a:fld id="{4019DDC2-03CD-4596-B3F6-53979FFD32CD}" type="slidenum">
               <a:t>&lt;#&gt;</a:t>
             </a:fld>
           </a:p>
@@ -7246,7 +7247,7 @@
         <p:txBody>
           <a:bodyPr/>
           <a:p>
-            <a:fld id="{CB76C628-8A99-4ECD-949C-DF9B78547DCE}" type="slidenum">
+            <a:fld id="{C0B8C997-7AE6-4D5A-9E78-B18CDC047C92}" type="slidenum">
               <a:t>&lt;#&gt;</a:t>
             </a:fld>
           </a:p>
@@ -7367,7 +7368,7 @@
         <p:txBody>
           <a:bodyPr/>
           <a:p>
-            <a:fld id="{6025B807-46CC-4244-A250-9EA9E965DD38}" type="slidenum">
+            <a:fld id="{F554F0F1-EDA3-4C80-9549-4CD6B529B34F}" type="slidenum">
               <a:t>&lt;#&gt;</a:t>
             </a:fld>
           </a:p>
@@ -7619,7 +7620,7 @@
         <p:txBody>
           <a:bodyPr/>
           <a:p>
-            <a:fld id="{76ACB2F3-0CE6-44A3-80E0-66F852F9181E}" type="slidenum">
+            <a:fld id="{83AB5992-ABFE-4C47-BCA4-286F79F81806}" type="slidenum">
               <a:t>&lt;#&gt;</a:t>
             </a:fld>
           </a:p>
@@ -7871,7 +7872,7 @@
         <p:txBody>
           <a:bodyPr/>
           <a:p>
-            <a:fld id="{92A184EA-2EC2-49A3-A553-4DFE650089AF}" type="slidenum">
+            <a:fld id="{CC7D65F5-006F-43FE-A4F8-E89CCA4B1896}" type="slidenum">
               <a:t>&lt;#&gt;</a:t>
             </a:fld>
           </a:p>
@@ -8123,7 +8124,7 @@
         <p:txBody>
           <a:bodyPr/>
           <a:p>
-            <a:fld id="{E20DD0EF-428F-4290-9E0B-803CCE39859C}" type="slidenum">
+            <a:fld id="{F2F8B0B7-D659-409D-ADB5-22125C84439A}" type="slidenum">
               <a:t>&lt;#&gt;</a:t>
             </a:fld>
           </a:p>
@@ -8332,7 +8333,7 @@
         <p:txBody>
           <a:bodyPr/>
           <a:p>
-            <a:fld id="{191B3920-86E0-4E9A-8D4B-21E37F16286B}" type="slidenum">
+            <a:fld id="{673D12EF-2E08-430C-8FA6-1AD703BFB691}" type="slidenum">
               <a:t>&lt;#&gt;</a:t>
             </a:fld>
           </a:p>
@@ -8627,7 +8628,7 @@
         <p:txBody>
           <a:bodyPr/>
           <a:p>
-            <a:fld id="{F2B777DA-226A-4989-9EFC-1E25229C863C}" type="slidenum">
+            <a:fld id="{5D471ED9-760A-4CF4-BD54-8A17FEF8BC2B}" type="slidenum">
               <a:t>&lt;#&gt;</a:t>
             </a:fld>
           </a:p>
@@ -9008,7 +9009,7 @@
         <p:txBody>
           <a:bodyPr/>
           <a:p>
-            <a:fld id="{02E9EA58-B2AB-433E-8C33-C639697CDD4C}" type="slidenum">
+            <a:fld id="{24EFE575-ED29-4F59-8E2A-ACE2C5B683EB}" type="slidenum">
               <a:t>&lt;#&gt;</a:t>
             </a:fld>
           </a:p>
@@ -9131,7 +9132,7 @@
         <p:txBody>
           <a:bodyPr/>
           <a:p>
-            <a:fld id="{D416386E-43C7-4EA8-A780-120BBE91372E}" type="slidenum">
+            <a:fld id="{2B3F7D86-3CC5-4E62-A953-52F94C99387C}" type="slidenum">
               <a:t>&lt;#&gt;</a:t>
             </a:fld>
           </a:p>
@@ -9252,7 +9253,7 @@
         <p:txBody>
           <a:bodyPr/>
           <a:p>
-            <a:fld id="{EC8FC5BC-188F-418F-9B78-975276C90C7B}" type="slidenum">
+            <a:fld id="{592AEB80-9F3C-4EA6-94EF-9081E8AB3EAC}" type="slidenum">
               <a:t>&lt;#&gt;</a:t>
             </a:fld>
           </a:p>
@@ -9504,7 +9505,7 @@
         <p:txBody>
           <a:bodyPr/>
           <a:p>
-            <a:fld id="{200331FB-1008-4A2E-908A-A44376696749}" type="slidenum">
+            <a:fld id="{8FC3456C-EEE1-4405-B484-74D9E13E534A}" type="slidenum">
               <a:t>&lt;#&gt;</a:t>
             </a:fld>
           </a:p>
@@ -9756,7 +9757,7 @@
         <p:txBody>
           <a:bodyPr/>
           <a:p>
-            <a:fld id="{523723A3-6835-448B-9D74-DBDD47439FB2}" type="slidenum">
+            <a:fld id="{A338C06F-B8CD-4573-9146-8E4B48512951}" type="slidenum">
               <a:t>&lt;#&gt;</a:t>
             </a:fld>
           </a:p>
@@ -10008,7 +10009,7 @@
         <p:txBody>
           <a:bodyPr/>
           <a:p>
-            <a:fld id="{9E4490F5-0FF6-45FE-9203-92ED65361506}" type="slidenum">
+            <a:fld id="{D2A555B5-0FC7-435C-A347-C817E8A1FA1B}" type="slidenum">
               <a:t>&lt;#&gt;</a:t>
             </a:fld>
           </a:p>
@@ -10501,7 +10502,7 @@
             <a:pPr indent="0" algn="r">
               <a:buNone/>
             </a:pPr>
-            <a:fld id="{F13740E2-9897-4D5D-AC7B-8FAAAA2BE6A6}" type="slidenum">
+            <a:fld id="{2F0A58E3-5852-45C9-B50C-614E8FE4A59C}" type="slidenum">
               <a:rPr b="0" lang="en-GB" sz="1400" spc="-1" strike="noStrike">
                 <a:solidFill>
                   <a:srgbClr val="ffffff"/>
@@ -11000,7 +11001,7 @@
             <a:pPr indent="0" algn="r">
               <a:buNone/>
             </a:pPr>
-            <a:fld id="{86418824-4F80-482A-A445-86DCE57DD369}" type="slidenum">
+            <a:fld id="{7FCBD58C-3DFA-45B9-B95A-484DA45EF1A5}" type="slidenum">
               <a:rPr b="0" lang="en-GB" sz="1400" spc="-1" strike="noStrike">
                 <a:solidFill>
                   <a:srgbClr val="000000"/>
@@ -11499,7 +11500,7 @@
             <a:pPr indent="0" algn="r">
               <a:buNone/>
             </a:pPr>
-            <a:fld id="{356EE545-9BCA-4A18-B5D9-4E4625521950}" type="slidenum">
+            <a:fld id="{22EF8DD5-0DDA-4688-A568-49C266A9E8D9}" type="slidenum">
               <a:rPr b="0" lang="en-GB" sz="1400" spc="-1" strike="noStrike">
                 <a:solidFill>
                   <a:srgbClr val="ffffff"/>
@@ -11998,7 +11999,7 @@
             <a:pPr indent="0" algn="r">
               <a:buNone/>
             </a:pPr>
-            <a:fld id="{654EC95E-2D73-4D8F-8D0F-F6D3DA21A929}" type="slidenum">
+            <a:fld id="{4A4D5AD7-66A5-48C6-A1FE-354D3296414B}" type="slidenum">
               <a:rPr b="0" lang="en-GB" sz="1400" spc="-1" strike="noStrike">
                 <a:solidFill>
                   <a:srgbClr val="000000"/>
@@ -12249,6 +12250,283 @@
       <p:sp>
         <p:nvSpPr>
           <p:cNvPr id="167" name="PlaceHolder 2"/>
+          <p:cNvSpPr>
+            <a:spLocks noGrp="1"/>
+          </p:cNvSpPr>
+          <p:nvPr>
+            <p:ph/>
+          </p:nvPr>
+        </p:nvSpPr>
+        <p:spPr>
+          <a:xfrm>
+            <a:off x="504000" y="1326600"/>
+            <a:ext cx="9071640" cy="3288240"/>
+          </a:xfrm>
+          <a:prstGeom prst="rect">
+            <a:avLst/>
+          </a:prstGeom>
+          <a:noFill/>
+          <a:ln w="0">
+            <a:noFill/>
+          </a:ln>
+        </p:spPr>
+        <p:txBody>
+          <a:bodyPr lIns="0" rIns="0" tIns="0" bIns="0" anchor="t">
+            <a:normAutofit/>
+          </a:bodyPr>
+          <a:p>
+            <a:pPr indent="0" algn="ctr">
+              <a:spcBef>
+                <a:spcPts val="1060"/>
+              </a:spcBef>
+              <a:buNone/>
+            </a:pPr>
+            <a:r>
+              <a:rPr b="0" lang="en-GB" sz="2400" spc="-1" strike="noStrike">
+                <a:solidFill>
+                  <a:srgbClr val="000000"/>
+                </a:solidFill>
+                <a:latin typeface="Arial"/>
+              </a:rPr>
+              <a:t>Body</a:t>
+            </a:r>
+            <a:endParaRPr b="0" lang="en-GB" sz="2400" spc="-1" strike="noStrike">
+              <a:solidFill>
+                <a:srgbClr val="000000"/>
+              </a:solidFill>
+              <a:latin typeface="Arial"/>
+            </a:endParaRPr>
+          </a:p>
+          <a:p>
+            <a:pPr indent="0" algn="ctr">
+              <a:spcBef>
+                <a:spcPts val="1060"/>
+              </a:spcBef>
+              <a:buNone/>
+            </a:pPr>
+            <a:r>
+              <a:rPr b="0" lang="en-GB" sz="2400" spc="-1" strike="noStrike">
+                <a:solidFill>
+                  <a:srgbClr val="000000"/>
+                </a:solidFill>
+                <a:latin typeface="Arial"/>
+              </a:rPr>
+              <a:t>.</a:t>
+            </a:r>
+            <a:endParaRPr b="0" lang="en-GB" sz="2400" spc="-1" strike="noStrike">
+              <a:solidFill>
+                <a:srgbClr val="000000"/>
+              </a:solidFill>
+              <a:latin typeface="Arial"/>
+            </a:endParaRPr>
+          </a:p>
+          <a:p>
+            <a:pPr indent="0" algn="ctr">
+              <a:spcBef>
+                <a:spcPts val="1060"/>
+              </a:spcBef>
+              <a:buNone/>
+            </a:pPr>
+            <a:r>
+              <a:rPr b="0" lang="en-GB" sz="2400" spc="-1" strike="noStrike">
+                <a:solidFill>
+                  <a:srgbClr val="000000"/>
+                </a:solidFill>
+                <a:latin typeface="Arial"/>
+              </a:rPr>
+              <a:t>.</a:t>
+            </a:r>
+            <a:endParaRPr b="0" lang="en-GB" sz="2400" spc="-1" strike="noStrike">
+              <a:solidFill>
+                <a:srgbClr val="000000"/>
+              </a:solidFill>
+              <a:latin typeface="Arial"/>
+            </a:endParaRPr>
+          </a:p>
+          <a:p>
+            <a:pPr indent="0" algn="ctr">
+              <a:spcBef>
+                <a:spcPts val="1060"/>
+              </a:spcBef>
+              <a:buNone/>
+            </a:pPr>
+            <a:r>
+              <a:rPr b="0" lang="en-GB" sz="2400" spc="-1" strike="noStrike">
+                <a:solidFill>
+                  <a:srgbClr val="000000"/>
+                </a:solidFill>
+                <a:latin typeface="Arial"/>
+              </a:rPr>
+              <a:t>.</a:t>
+            </a:r>
+            <a:endParaRPr b="0" lang="en-GB" sz="2400" spc="-1" strike="noStrike">
+              <a:solidFill>
+                <a:srgbClr val="000000"/>
+              </a:solidFill>
+              <a:latin typeface="Arial"/>
+            </a:endParaRPr>
+          </a:p>
+          <a:p>
+            <a:pPr indent="0" algn="ctr">
+              <a:spcBef>
+                <a:spcPts val="1060"/>
+              </a:spcBef>
+              <a:buNone/>
+            </a:pPr>
+            <a:r>
+              <a:rPr b="0" lang="en-GB" sz="2400" spc="-1" strike="noStrike">
+                <a:solidFill>
+                  <a:srgbClr val="000000"/>
+                </a:solidFill>
+                <a:latin typeface="Arial"/>
+              </a:rPr>
+              <a:t>.</a:t>
+            </a:r>
+            <a:endParaRPr b="0" lang="en-GB" sz="2400" spc="-1" strike="noStrike">
+              <a:solidFill>
+                <a:srgbClr val="000000"/>
+              </a:solidFill>
+              <a:latin typeface="Arial"/>
+            </a:endParaRPr>
+          </a:p>
+          <a:p>
+            <a:pPr indent="0" algn="ctr">
+              <a:spcBef>
+                <a:spcPts val="1060"/>
+              </a:spcBef>
+              <a:buNone/>
+            </a:pPr>
+            <a:r>
+              <a:rPr b="0" lang="en-GB" sz="2400" spc="-1" strike="noStrike">
+                <a:solidFill>
+                  <a:srgbClr val="000000"/>
+                </a:solidFill>
+                <a:latin typeface="Arial"/>
+              </a:rPr>
+              <a:t>.</a:t>
+            </a:r>
+            <a:endParaRPr b="0" lang="en-GB" sz="2400" spc="-1" strike="noStrike">
+              <a:solidFill>
+                <a:srgbClr val="000000"/>
+              </a:solidFill>
+              <a:latin typeface="Arial"/>
+            </a:endParaRPr>
+          </a:p>
+          <a:p>
+            <a:pPr indent="0" algn="ctr">
+              <a:spcBef>
+                <a:spcPts val="1060"/>
+              </a:spcBef>
+              <a:buNone/>
+            </a:pPr>
+            <a:r>
+              <a:rPr b="0" lang="en-GB" sz="2400" spc="-1" strike="noStrike">
+                <a:solidFill>
+                  <a:srgbClr val="000000"/>
+                </a:solidFill>
+                <a:latin typeface="Arial"/>
+              </a:rPr>
+              <a:t>.</a:t>
+            </a:r>
+            <a:endParaRPr b="0" lang="en-GB" sz="2400" spc="-1" strike="noStrike">
+              <a:solidFill>
+                <a:srgbClr val="000000"/>
+              </a:solidFill>
+              <a:latin typeface="Arial"/>
+            </a:endParaRPr>
+          </a:p>
+        </p:txBody>
+      </p:sp>
+    </p:spTree>
+  </p:cSld>
+  <mc:AlternateContent>
+    <mc:Choice Requires="p14">
+      <p:transition spd="slow" p14:dur="2000"/>
+    </mc:Choice>
+    <mc:Fallback>
+      <p:transition spd="slow"/>
+    </mc:Fallback>
+  </mc:AlternateContent>
+</p:sld>
+</file>
+
+<file path=ppt/slides/slide3.xml><?xml version="1.0" encoding="utf-8"?>
+<p:sld xmlns:a="http://schemas.openxmlformats.org/drawingml/2006/main" xmlns:p="http://schemas.openxmlformats.org/presentationml/2006/main" xmlns:r="http://schemas.openxmlformats.org/officeDocument/2006/relationships" xmlns:p14="http://schemas.microsoft.com/office/powerpoint/2010/main" xmlns:p15="http://schemas.microsoft.com/office/powerpoint/2012/main" xmlns:mc="http://schemas.openxmlformats.org/markup-compatibility/2006">
+  <p:cSld>
+    <p:bg>
+      <p:bgPr>
+        <a:blipFill rotWithShape="0">
+          <a:blip r:embed="rId1"/>
+          <a:stretch/>
+        </a:blipFill>
+      </p:bgPr>
+    </p:bg>
+    <p:spTree>
+      <p:nvGrpSpPr>
+        <p:cNvPr id="1" name=""/>
+        <p:cNvGrpSpPr/>
+        <p:nvPr/>
+      </p:nvGrpSpPr>
+      <p:grpSpPr>
+        <a:xfrm>
+          <a:off x="0" y="0"/>
+          <a:ext cx="0" cy="0"/>
+          <a:chOff x="0" y="0"/>
+          <a:chExt cx="0" cy="0"/>
+        </a:xfrm>
+      </p:grpSpPr>
+      <p:sp>
+        <p:nvSpPr>
+          <p:cNvPr id="168" name="PlaceHolder 1"/>
+          <p:cNvSpPr>
+            <a:spLocks noGrp="1"/>
+          </p:cNvSpPr>
+          <p:nvPr>
+            <p:ph type="title"/>
+          </p:nvPr>
+        </p:nvSpPr>
+        <p:spPr>
+          <a:xfrm>
+            <a:off x="504000" y="225720"/>
+            <a:ext cx="9071640" cy="946800"/>
+          </a:xfrm>
+          <a:prstGeom prst="rect">
+            <a:avLst/>
+          </a:prstGeom>
+          <a:noFill/>
+          <a:ln w="0">
+            <a:noFill/>
+          </a:ln>
+        </p:spPr>
+        <p:txBody>
+          <a:bodyPr lIns="0" rIns="0" tIns="0" bIns="0" anchor="ctr">
+            <a:noAutofit/>
+          </a:bodyPr>
+          <a:p>
+            <a:pPr indent="0" algn="ctr">
+              <a:buNone/>
+            </a:pPr>
+            <a:r>
+              <a:rPr b="0" lang="en-GB" sz="3300" spc="-1" strike="noStrike">
+                <a:solidFill>
+                  <a:srgbClr val="000000"/>
+                </a:solidFill>
+                <a:latin typeface="Arial"/>
+              </a:rPr>
+              <a:t>Slide Title</a:t>
+            </a:r>
+            <a:endParaRPr b="0" lang="en-GB" sz="3300" spc="-1" strike="noStrike">
+              <a:solidFill>
+                <a:srgbClr val="000000"/>
+              </a:solidFill>
+              <a:latin typeface="Arial"/>
+            </a:endParaRPr>
+          </a:p>
+        </p:txBody>
+      </p:sp>
+      <p:sp>
+        <p:nvSpPr>
+          <p:cNvPr id="169" name="PlaceHolder 2"/>
           <p:cNvSpPr>
             <a:spLocks noGrp="1"/>
           </p:cNvSpPr>

</xml_diff>